<commit_message>
adding PPT for Google Devpost Hackathon events of my project GoogleMediBuddy
</commit_message>
<xml_diff>
--- a/GoogleMediBuddy/PPT/Devpost Hackathon events_ppt.pptx
+++ b/GoogleMediBuddy/PPT/Devpost Hackathon events_ppt.pptx
@@ -2550,12 +2550,12 @@
         <p:spPr>
           <a:xfrm>
             <a:off x="855620" y="2933105"/>
-            <a:ext cx="9582736" cy="2760571"/>
+            <a:ext cx="9582736" cy="3477527"/>
           </a:xfrm>
         </p:spPr>
         <p:txBody>
           <a:bodyPr>
-            <a:normAutofit fontScale="85000" lnSpcReduction="20000"/>
+            <a:normAutofit fontScale="62500" lnSpcReduction="20000"/>
           </a:bodyPr>
           <a:lstStyle/>
           <a:p>
@@ -2579,6 +2579,23 @@
                 </a:solidFill>
               </a:rPr>
               <a:t>Development by Amit Gupta </a:t>
+            </a:r>
+          </a:p>
+          <a:p>
+            <a:endParaRPr lang="en-US" sz="2400" dirty="0">
+              <a:solidFill>
+                <a:schemeClr val="bg1"/>
+              </a:solidFill>
+            </a:endParaRPr>
+          </a:p>
+          <a:p>
+            <a:r>
+              <a:rPr lang="en-US" sz="2400" dirty="0">
+                <a:solidFill>
+                  <a:schemeClr val="bg1"/>
+                </a:solidFill>
+              </a:rPr>
+              <a:t>&amp; Yogesh Gupta</a:t>
             </a:r>
           </a:p>
           <a:p>
@@ -2660,6 +2677,66 @@
           </a:p>
         </p:txBody>
       </p:sp>
+      <p:pic>
+        <p:nvPicPr>
+          <p:cNvPr id="5" name="Picture 4">
+            <a:extLst>
+              <a:ext uri="{FF2B5EF4-FFF2-40B4-BE49-F238E27FC236}">
+                <a16:creationId xmlns:a16="http://schemas.microsoft.com/office/drawing/2014/main" id="{C24F77A2-3E99-CF11-8AD2-5FF45E2FE347}"/>
+              </a:ext>
+            </a:extLst>
+          </p:cNvPr>
+          <p:cNvPicPr>
+            <a:picLocks noChangeAspect="1"/>
+          </p:cNvPicPr>
+          <p:nvPr/>
+        </p:nvPicPr>
+        <p:blipFill>
+          <a:blip r:embed="rId3"/>
+          <a:stretch>
+            <a:fillRect/>
+          </a:stretch>
+        </p:blipFill>
+        <p:spPr>
+          <a:xfrm>
+            <a:off x="3588774" y="3287486"/>
+            <a:ext cx="1322546" cy="844314"/>
+          </a:xfrm>
+          <a:prstGeom prst="rect">
+            <a:avLst/>
+          </a:prstGeom>
+        </p:spPr>
+      </p:pic>
+      <p:pic>
+        <p:nvPicPr>
+          <p:cNvPr id="6" name="Picture 5">
+            <a:extLst>
+              <a:ext uri="{FF2B5EF4-FFF2-40B4-BE49-F238E27FC236}">
+                <a16:creationId xmlns:a16="http://schemas.microsoft.com/office/drawing/2014/main" id="{B31D63CF-2073-A8B7-960A-FAF1F44EDEDE}"/>
+              </a:ext>
+            </a:extLst>
+          </p:cNvPr>
+          <p:cNvPicPr>
+            <a:picLocks noChangeAspect="1"/>
+          </p:cNvPicPr>
+          <p:nvPr/>
+        </p:nvPicPr>
+        <p:blipFill>
+          <a:blip r:embed="rId4"/>
+          <a:stretch>
+            <a:fillRect/>
+          </a:stretch>
+        </p:blipFill>
+        <p:spPr>
+          <a:xfrm>
+            <a:off x="3588774" y="4215601"/>
+            <a:ext cx="1322546" cy="951477"/>
+          </a:xfrm>
+          <a:prstGeom prst="rect">
+            <a:avLst/>
+          </a:prstGeom>
+        </p:spPr>
+      </p:pic>
     </p:spTree>
     <p:extLst>
       <p:ext uri="{BB962C8B-B14F-4D97-AF65-F5344CB8AC3E}">
@@ -3277,12 +3354,6 @@
               </a:rPr>
               <a:t>Github</a:t>
             </a:r>
-            <a:r>
-              <a:rPr lang="en-US" sz="3200" b="1" dirty="0">
-                <a:latin typeface="Arial" panose="020B0604020202020204" pitchFamily="34" charset="0"/>
-              </a:rPr>
-              <a:t>.</a:t>
-            </a:r>
             <a:endParaRPr lang="en-US" sz="1200" dirty="0"/>
           </a:p>
           <a:p>
@@ -3631,7 +3702,7 @@
                 <a:ea typeface="+mj-ea"/>
                 <a:cs typeface="+mj-cs"/>
               </a:rPr>
-              <a:t>I learnt a lot from this events and also have enjoyed the my journey with this hackathon events.</a:t>
+              <a:t>We learnt a lot from this event and also have enjoyed the learnings with this hackathon event.</a:t>
             </a:r>
           </a:p>
           <a:p>
@@ -3649,7 +3720,7 @@
                 <a:ea typeface="+mj-ea"/>
                 <a:cs typeface="+mj-cs"/>
               </a:rPr>
-              <a:t>Again Thank You very much Every one for giving us this platform.</a:t>
+              <a:t>Again Thank You very much every one for giving us this platform.</a:t>
             </a:r>
           </a:p>
           <a:p>

</xml_diff>